<commit_message>
Revert "merge conflict resolution"
This reverts commit 12be9f5fc76dc7d437fce717ee765c255aa57671.
</commit_message>
<xml_diff>
--- a/instructionscreen.pptx
+++ b/instructionscreen.pptx
@@ -7,15 +7,14 @@
   <p:sldIdLst>
     <p:sldId id="256" r:id="rId2"/>
     <p:sldId id="257" r:id="rId3"/>
-    <p:sldId id="268" r:id="rId4"/>
-    <p:sldId id="260" r:id="rId5"/>
-    <p:sldId id="261" r:id="rId6"/>
-    <p:sldId id="262" r:id="rId7"/>
-    <p:sldId id="263" r:id="rId8"/>
-    <p:sldId id="264" r:id="rId9"/>
-    <p:sldId id="265" r:id="rId10"/>
-    <p:sldId id="266" r:id="rId11"/>
-    <p:sldId id="267" r:id="rId12"/>
+    <p:sldId id="258" r:id="rId4"/>
+    <p:sldId id="259" r:id="rId5"/>
+    <p:sldId id="260" r:id="rId6"/>
+    <p:sldId id="261" r:id="rId7"/>
+    <p:sldId id="262" r:id="rId8"/>
+    <p:sldId id="263" r:id="rId9"/>
+    <p:sldId id="264" r:id="rId10"/>
+    <p:sldId id="265" r:id="rId11"/>
   </p:sldIdLst>
   <p:sldSz cx="8999538" cy="5400675"/>
   <p:notesSz cx="6858000" cy="9144000"/>
@@ -253,7 +252,7 @@
           <a:p>
             <a:fld id="{206B44B9-13F3-F642-908A-4972833A2ED9}" type="datetimeFigureOut">
               <a:rPr lang="fr-FR" smtClean="0"/>
-              <a:t>11/06/2016</a:t>
+              <a:t>10/06/2016</a:t>
             </a:fld>
             <a:endParaRPr lang="fr-FR"/>
           </a:p>
@@ -423,7 +422,7 @@
           <a:p>
             <a:fld id="{206B44B9-13F3-F642-908A-4972833A2ED9}" type="datetimeFigureOut">
               <a:rPr lang="fr-FR" smtClean="0"/>
-              <a:t>11/06/2016</a:t>
+              <a:t>10/06/2016</a:t>
             </a:fld>
             <a:endParaRPr lang="fr-FR"/>
           </a:p>
@@ -603,7 +602,7 @@
           <a:p>
             <a:fld id="{206B44B9-13F3-F642-908A-4972833A2ED9}" type="datetimeFigureOut">
               <a:rPr lang="fr-FR" smtClean="0"/>
-              <a:t>11/06/2016</a:t>
+              <a:t>10/06/2016</a:t>
             </a:fld>
             <a:endParaRPr lang="fr-FR"/>
           </a:p>
@@ -773,7 +772,7 @@
           <a:p>
             <a:fld id="{206B44B9-13F3-F642-908A-4972833A2ED9}" type="datetimeFigureOut">
               <a:rPr lang="fr-FR" smtClean="0"/>
-              <a:t>11/06/2016</a:t>
+              <a:t>10/06/2016</a:t>
             </a:fld>
             <a:endParaRPr lang="fr-FR"/>
           </a:p>
@@ -1019,7 +1018,7 @@
           <a:p>
             <a:fld id="{206B44B9-13F3-F642-908A-4972833A2ED9}" type="datetimeFigureOut">
               <a:rPr lang="fr-FR" smtClean="0"/>
-              <a:t>11/06/2016</a:t>
+              <a:t>10/06/2016</a:t>
             </a:fld>
             <a:endParaRPr lang="fr-FR"/>
           </a:p>
@@ -1251,7 +1250,7 @@
           <a:p>
             <a:fld id="{206B44B9-13F3-F642-908A-4972833A2ED9}" type="datetimeFigureOut">
               <a:rPr lang="fr-FR" smtClean="0"/>
-              <a:t>11/06/2016</a:t>
+              <a:t>10/06/2016</a:t>
             </a:fld>
             <a:endParaRPr lang="fr-FR"/>
           </a:p>
@@ -1618,7 +1617,7 @@
           <a:p>
             <a:fld id="{206B44B9-13F3-F642-908A-4972833A2ED9}" type="datetimeFigureOut">
               <a:rPr lang="fr-FR" smtClean="0"/>
-              <a:t>11/06/2016</a:t>
+              <a:t>10/06/2016</a:t>
             </a:fld>
             <a:endParaRPr lang="fr-FR"/>
           </a:p>
@@ -1736,7 +1735,7 @@
           <a:p>
             <a:fld id="{206B44B9-13F3-F642-908A-4972833A2ED9}" type="datetimeFigureOut">
               <a:rPr lang="fr-FR" smtClean="0"/>
-              <a:t>11/06/2016</a:t>
+              <a:t>10/06/2016</a:t>
             </a:fld>
             <a:endParaRPr lang="fr-FR"/>
           </a:p>
@@ -1831,7 +1830,7 @@
           <a:p>
             <a:fld id="{206B44B9-13F3-F642-908A-4972833A2ED9}" type="datetimeFigureOut">
               <a:rPr lang="fr-FR" smtClean="0"/>
-              <a:t>11/06/2016</a:t>
+              <a:t>10/06/2016</a:t>
             </a:fld>
             <a:endParaRPr lang="fr-FR"/>
           </a:p>
@@ -2108,7 +2107,7 @@
           <a:p>
             <a:fld id="{206B44B9-13F3-F642-908A-4972833A2ED9}" type="datetimeFigureOut">
               <a:rPr lang="fr-FR" smtClean="0"/>
-              <a:t>11/06/2016</a:t>
+              <a:t>10/06/2016</a:t>
             </a:fld>
             <a:endParaRPr lang="fr-FR"/>
           </a:p>
@@ -2365,7 +2364,7 @@
           <a:p>
             <a:fld id="{206B44B9-13F3-F642-908A-4972833A2ED9}" type="datetimeFigureOut">
               <a:rPr lang="fr-FR" smtClean="0"/>
-              <a:t>11/06/2016</a:t>
+              <a:t>10/06/2016</a:t>
             </a:fld>
             <a:endParaRPr lang="fr-FR"/>
           </a:p>
@@ -2578,7 +2577,7 @@
           <a:p>
             <a:fld id="{206B44B9-13F3-F642-908A-4972833A2ED9}" type="datetimeFigureOut">
               <a:rPr lang="fr-FR" smtClean="0"/>
-              <a:t>11/06/2016</a:t>
+              <a:t>10/06/2016</a:t>
             </a:fld>
             <a:endParaRPr lang="fr-FR"/>
           </a:p>
@@ -3065,8 +3064,8 @@
         </p:blipFill>
         <p:spPr>
           <a:xfrm>
-            <a:off x="1" y="-318052"/>
-            <a:ext cx="8999538" cy="6380922"/>
+            <a:off x="0" y="0"/>
+            <a:ext cx="8999538" cy="5400675"/>
           </a:xfrm>
           <a:prstGeom prst="rect">
             <a:avLst/>
@@ -3076,67 +3075,7 @@
     </p:spTree>
     <p:extLst>
       <p:ext uri="{BB962C8B-B14F-4D97-AF65-F5344CB8AC3E}">
-        <p14:creationId xmlns:p14="http://schemas.microsoft.com/office/powerpoint/2010/main" val="1057307355"/>
-      </p:ext>
-    </p:extLst>
-  </p:cSld>
-  <p:clrMapOvr>
-    <a:masterClrMapping/>
-  </p:clrMapOvr>
-</p:sld>
-</file>
-
-<file path=ppt/slides/slide11.xml><?xml version="1.0" encoding="utf-8"?>
-<p:sld xmlns:a="http://schemas.openxmlformats.org/drawingml/2006/main" xmlns:r="http://schemas.openxmlformats.org/officeDocument/2006/relationships" xmlns:p="http://schemas.openxmlformats.org/presentationml/2006/main">
-  <p:cSld>
-    <p:spTree>
-      <p:nvGrpSpPr>
-        <p:cNvPr id="1" name=""/>
-        <p:cNvGrpSpPr/>
-        <p:nvPr/>
-      </p:nvGrpSpPr>
-      <p:grpSpPr>
-        <a:xfrm>
-          <a:off x="0" y="0"/>
-          <a:ext cx="0" cy="0"/>
-          <a:chOff x="0" y="0"/>
-          <a:chExt cx="0" cy="0"/>
-        </a:xfrm>
-      </p:grpSpPr>
-      <p:pic>
-        <p:nvPicPr>
-          <p:cNvPr id="2" name="Picture 1"/>
-          <p:cNvPicPr>
-            <a:picLocks noChangeAspect="1"/>
-          </p:cNvPicPr>
-          <p:nvPr/>
-        </p:nvPicPr>
-        <p:blipFill>
-          <a:blip r:embed="rId2">
-            <a:extLst>
-              <a:ext uri="{28A0092B-C50C-407E-A947-70E740481C1C}">
-                <a14:useLocalDpi xmlns:a14="http://schemas.microsoft.com/office/drawing/2010/main" val="0"/>
-              </a:ext>
-            </a:extLst>
-          </a:blip>
-          <a:stretch>
-            <a:fillRect/>
-          </a:stretch>
-        </p:blipFill>
-        <p:spPr>
-          <a:xfrm>
-            <a:off x="1" y="-318052"/>
-            <a:ext cx="8999538" cy="6380922"/>
-          </a:xfrm>
-          <a:prstGeom prst="rect">
-            <a:avLst/>
-          </a:prstGeom>
-        </p:spPr>
-      </p:pic>
-    </p:spTree>
-    <p:extLst>
-      <p:ext uri="{BB962C8B-B14F-4D97-AF65-F5344CB8AC3E}">
-        <p14:creationId xmlns:p14="http://schemas.microsoft.com/office/powerpoint/2010/main" val="1855858505"/>
+        <p14:creationId xmlns:p14="http://schemas.microsoft.com/office/powerpoint/2010/main" val="1721526603"/>
       </p:ext>
     </p:extLst>
   </p:cSld>
@@ -3346,93 +3285,71 @@
           <a:chExt cx="0" cy="0"/>
         </a:xfrm>
       </p:grpSpPr>
-      <p:sp>
-        <p:nvSpPr>
-          <p:cNvPr id="2" name="Rounded Rectangle 1"/>
-          <p:cNvSpPr/>
+      <p:pic>
+        <p:nvPicPr>
+          <p:cNvPr id="2" name="Picture 1"/>
+          <p:cNvPicPr>
+            <a:picLocks noChangeAspect="1"/>
+          </p:cNvPicPr>
           <p:nvPr/>
-        </p:nvSpPr>
+        </p:nvPicPr>
+        <p:blipFill>
+          <a:blip r:embed="rId2">
+            <a:extLst>
+              <a:ext uri="{28A0092B-C50C-407E-A947-70E740481C1C}">
+                <a14:useLocalDpi xmlns:a14="http://schemas.microsoft.com/office/drawing/2010/main" val="0"/>
+              </a:ext>
+            </a:extLst>
+          </a:blip>
+          <a:stretch>
+            <a:fillRect/>
+          </a:stretch>
+        </p:blipFill>
         <p:spPr>
           <a:xfrm>
-            <a:off x="0" y="-1"/>
+            <a:off x="0" y="0"/>
             <a:ext cx="8999538" cy="5400675"/>
           </a:xfrm>
-          <a:prstGeom prst="roundRect">
+          <a:prstGeom prst="rect">
             <a:avLst/>
           </a:prstGeom>
         </p:spPr>
-        <p:style>
-          <a:lnRef idx="2">
-            <a:schemeClr val="accent1">
-              <a:shade val="50000"/>
-            </a:schemeClr>
-          </a:lnRef>
-          <a:fillRef idx="1">
-            <a:schemeClr val="accent1"/>
-          </a:fillRef>
-          <a:effectRef idx="0">
-            <a:schemeClr val="accent1"/>
-          </a:effectRef>
-          <a:fontRef idx="minor">
-            <a:schemeClr val="lt1"/>
-          </a:fontRef>
-        </p:style>
-        <p:txBody>
-          <a:bodyPr rtlCol="0" anchor="ctr"/>
-          <a:lstStyle/>
-          <a:p>
-            <a:pPr algn="ctr"/>
-            <a:endParaRPr lang="fr-FR"/>
-          </a:p>
-        </p:txBody>
-      </p:sp>
-      <p:sp>
-        <p:nvSpPr>
-          <p:cNvPr id="3" name="Rounded Rectangle 2"/>
-          <p:cNvSpPr/>
+      </p:pic>
+      <p:pic>
+        <p:nvPicPr>
+          <p:cNvPr id="3" name="Picture 2"/>
+          <p:cNvPicPr>
+            <a:picLocks noChangeAspect="1"/>
+          </p:cNvPicPr>
           <p:nvPr/>
-        </p:nvSpPr>
+        </p:nvPicPr>
+        <p:blipFill rotWithShape="1">
+          <a:blip r:embed="rId3">
+            <a:extLst>
+              <a:ext uri="{28A0092B-C50C-407E-A947-70E740481C1C}">
+                <a14:useLocalDpi xmlns:a14="http://schemas.microsoft.com/office/drawing/2010/main" val="0"/>
+              </a:ext>
+            </a:extLst>
+          </a:blip>
+          <a:srcRect l="23315" t="61976" r="70505" b="22266"/>
+          <a:stretch/>
+        </p:blipFill>
         <p:spPr>
           <a:xfrm>
-            <a:off x="295517" y="270219"/>
-            <a:ext cx="8408504" cy="4860234"/>
+            <a:off x="1462992" y="1400269"/>
+            <a:ext cx="440055" cy="460058"/>
           </a:xfrm>
           <a:prstGeom prst="roundRect">
-            <a:avLst/>
+            <a:avLst>
+              <a:gd name="adj" fmla="val 13636"/>
+            </a:avLst>
           </a:prstGeom>
-          <a:solidFill>
-            <a:schemeClr val="bg1"/>
-          </a:solidFill>
         </p:spPr>
-        <p:style>
-          <a:lnRef idx="2">
-            <a:schemeClr val="dk1">
-              <a:shade val="50000"/>
-            </a:schemeClr>
-          </a:lnRef>
-          <a:fillRef idx="1">
-            <a:schemeClr val="dk1"/>
-          </a:fillRef>
-          <a:effectRef idx="0">
-            <a:schemeClr val="dk1"/>
-          </a:effectRef>
-          <a:fontRef idx="minor">
-            <a:schemeClr val="lt1"/>
-          </a:fontRef>
-        </p:style>
-        <p:txBody>
-          <a:bodyPr rtlCol="0" anchor="ctr"/>
-          <a:lstStyle/>
-          <a:p>
-            <a:pPr algn="ctr"/>
-            <a:endParaRPr lang="fr-FR"/>
-          </a:p>
-        </p:txBody>
-      </p:sp>
+      </p:pic>
     </p:spTree>
     <p:extLst>
       <p:ext uri="{BB962C8B-B14F-4D97-AF65-F5344CB8AC3E}">
-        <p14:creationId xmlns:p14="http://schemas.microsoft.com/office/powerpoint/2010/main" val="1162975011"/>
+        <p14:creationId xmlns:p14="http://schemas.microsoft.com/office/powerpoint/2010/main" val="1461220517"/>
       </p:ext>
     </p:extLst>
   </p:cSld>
@@ -3481,8 +3398,8 @@
         </p:blipFill>
         <p:spPr>
           <a:xfrm>
-            <a:off x="1" y="-318052"/>
-            <a:ext cx="8999538" cy="6380922"/>
+            <a:off x="0" y="0"/>
+            <a:ext cx="8999538" cy="5400675"/>
           </a:xfrm>
           <a:prstGeom prst="rect">
             <a:avLst/>
@@ -3492,7 +3409,7 @@
     </p:spTree>
     <p:extLst>
       <p:ext uri="{BB962C8B-B14F-4D97-AF65-F5344CB8AC3E}">
-        <p14:creationId xmlns:p14="http://schemas.microsoft.com/office/powerpoint/2010/main" val="1769398473"/>
+        <p14:creationId xmlns:p14="http://schemas.microsoft.com/office/powerpoint/2010/main" val="1855489052"/>
       </p:ext>
     </p:extLst>
   </p:cSld>
@@ -3541,8 +3458,8 @@
         </p:blipFill>
         <p:spPr>
           <a:xfrm>
-            <a:off x="1" y="-318052"/>
-            <a:ext cx="8999538" cy="6380922"/>
+            <a:off x="0" y="0"/>
+            <a:ext cx="8999538" cy="5400675"/>
           </a:xfrm>
           <a:prstGeom prst="rect">
             <a:avLst/>
@@ -3552,7 +3469,7 @@
     </p:spTree>
     <p:extLst>
       <p:ext uri="{BB962C8B-B14F-4D97-AF65-F5344CB8AC3E}">
-        <p14:creationId xmlns:p14="http://schemas.microsoft.com/office/powerpoint/2010/main" val="1824999657"/>
+        <p14:creationId xmlns:p14="http://schemas.microsoft.com/office/powerpoint/2010/main" val="1769398473"/>
       </p:ext>
     </p:extLst>
   </p:cSld>
@@ -3601,8 +3518,8 @@
         </p:blipFill>
         <p:spPr>
           <a:xfrm>
-            <a:off x="1" y="-318052"/>
-            <a:ext cx="8999538" cy="6380922"/>
+            <a:off x="0" y="0"/>
+            <a:ext cx="8999538" cy="5400675"/>
           </a:xfrm>
           <a:prstGeom prst="rect">
             <a:avLst/>
@@ -3612,7 +3529,7 @@
     </p:spTree>
     <p:extLst>
       <p:ext uri="{BB962C8B-B14F-4D97-AF65-F5344CB8AC3E}">
-        <p14:creationId xmlns:p14="http://schemas.microsoft.com/office/powerpoint/2010/main" val="523593147"/>
+        <p14:creationId xmlns:p14="http://schemas.microsoft.com/office/powerpoint/2010/main" val="2074075702"/>
       </p:ext>
     </p:extLst>
   </p:cSld>
@@ -3661,8 +3578,8 @@
         </p:blipFill>
         <p:spPr>
           <a:xfrm>
-            <a:off x="1" y="-318052"/>
-            <a:ext cx="8999538" cy="6380922"/>
+            <a:off x="0" y="0"/>
+            <a:ext cx="8999538" cy="5400675"/>
           </a:xfrm>
           <a:prstGeom prst="rect">
             <a:avLst/>
@@ -3672,7 +3589,7 @@
     </p:spTree>
     <p:extLst>
       <p:ext uri="{BB962C8B-B14F-4D97-AF65-F5344CB8AC3E}">
-        <p14:creationId xmlns:p14="http://schemas.microsoft.com/office/powerpoint/2010/main" val="951978855"/>
+        <p14:creationId xmlns:p14="http://schemas.microsoft.com/office/powerpoint/2010/main" val="606803288"/>
       </p:ext>
     </p:extLst>
   </p:cSld>
@@ -3721,8 +3638,8 @@
         </p:blipFill>
         <p:spPr>
           <a:xfrm>
-            <a:off x="1" y="-318052"/>
-            <a:ext cx="8999538" cy="6380922"/>
+            <a:off x="0" y="0"/>
+            <a:ext cx="8999538" cy="5400675"/>
           </a:xfrm>
           <a:prstGeom prst="rect">
             <a:avLst/>
@@ -3732,7 +3649,7 @@
     </p:spTree>
     <p:extLst>
       <p:ext uri="{BB962C8B-B14F-4D97-AF65-F5344CB8AC3E}">
-        <p14:creationId xmlns:p14="http://schemas.microsoft.com/office/powerpoint/2010/main" val="2031012671"/>
+        <p14:creationId xmlns:p14="http://schemas.microsoft.com/office/powerpoint/2010/main" val="2014866953"/>
       </p:ext>
     </p:extLst>
   </p:cSld>
@@ -3781,8 +3698,8 @@
         </p:blipFill>
         <p:spPr>
           <a:xfrm>
-            <a:off x="1" y="-318052"/>
-            <a:ext cx="8999538" cy="6380922"/>
+            <a:off x="0" y="0"/>
+            <a:ext cx="8999538" cy="5400675"/>
           </a:xfrm>
           <a:prstGeom prst="rect">
             <a:avLst/>
@@ -3792,7 +3709,7 @@
     </p:spTree>
     <p:extLst>
       <p:ext uri="{BB962C8B-B14F-4D97-AF65-F5344CB8AC3E}">
-        <p14:creationId xmlns:p14="http://schemas.microsoft.com/office/powerpoint/2010/main" val="932188721"/>
+        <p14:creationId xmlns:p14="http://schemas.microsoft.com/office/powerpoint/2010/main" val="859811423"/>
       </p:ext>
     </p:extLst>
   </p:cSld>

</xml_diff>